<commit_message>
Finalized article for MilanoR blog and sent it!
GENERAL:
- Updated a few things in the article (.Rmd file) and generated PDF to send to Mariachiara.

New files
---------
- envnames-MilanoRBlog-Introduction.pdf.
</commit_message>
<xml_diff>
--- a/docs/EnvironmentsMap.pptx
+++ b/docs/EnvironmentsMap.pptx
@@ -288,7 +288,7 @@
           <a:p>
             <a:fld id="{B6DD1D87-65A1-464B-9CB6-79AFEB8594A9}" type="datetimeFigureOut">
               <a:rPr lang="en-US" smtClean="0"/>
-              <a:t>5/8/2019</a:t>
+              <a:t>5/15/2019</a:t>
             </a:fld>
             <a:endParaRPr lang="en-US"/>
           </a:p>
@@ -458,7 +458,7 @@
           <a:p>
             <a:fld id="{B6DD1D87-65A1-464B-9CB6-79AFEB8594A9}" type="datetimeFigureOut">
               <a:rPr lang="en-US" smtClean="0"/>
-              <a:t>5/8/2019</a:t>
+              <a:t>5/15/2019</a:t>
             </a:fld>
             <a:endParaRPr lang="en-US"/>
           </a:p>
@@ -638,7 +638,7 @@
           <a:p>
             <a:fld id="{B6DD1D87-65A1-464B-9CB6-79AFEB8594A9}" type="datetimeFigureOut">
               <a:rPr lang="en-US" smtClean="0"/>
-              <a:t>5/8/2019</a:t>
+              <a:t>5/15/2019</a:t>
             </a:fld>
             <a:endParaRPr lang="en-US"/>
           </a:p>
@@ -808,7 +808,7 @@
           <a:p>
             <a:fld id="{B6DD1D87-65A1-464B-9CB6-79AFEB8594A9}" type="datetimeFigureOut">
               <a:rPr lang="en-US" smtClean="0"/>
-              <a:t>5/8/2019</a:t>
+              <a:t>5/15/2019</a:t>
             </a:fld>
             <a:endParaRPr lang="en-US"/>
           </a:p>
@@ -1054,7 +1054,7 @@
           <a:p>
             <a:fld id="{B6DD1D87-65A1-464B-9CB6-79AFEB8594A9}" type="datetimeFigureOut">
               <a:rPr lang="en-US" smtClean="0"/>
-              <a:t>5/8/2019</a:t>
+              <a:t>5/15/2019</a:t>
             </a:fld>
             <a:endParaRPr lang="en-US"/>
           </a:p>
@@ -1342,7 +1342,7 @@
           <a:p>
             <a:fld id="{B6DD1D87-65A1-464B-9CB6-79AFEB8594A9}" type="datetimeFigureOut">
               <a:rPr lang="en-US" smtClean="0"/>
-              <a:t>5/8/2019</a:t>
+              <a:t>5/15/2019</a:t>
             </a:fld>
             <a:endParaRPr lang="en-US"/>
           </a:p>
@@ -1764,7 +1764,7 @@
           <a:p>
             <a:fld id="{B6DD1D87-65A1-464B-9CB6-79AFEB8594A9}" type="datetimeFigureOut">
               <a:rPr lang="en-US" smtClean="0"/>
-              <a:t>5/8/2019</a:t>
+              <a:t>5/15/2019</a:t>
             </a:fld>
             <a:endParaRPr lang="en-US"/>
           </a:p>
@@ -1882,7 +1882,7 @@
           <a:p>
             <a:fld id="{B6DD1D87-65A1-464B-9CB6-79AFEB8594A9}" type="datetimeFigureOut">
               <a:rPr lang="en-US" smtClean="0"/>
-              <a:t>5/8/2019</a:t>
+              <a:t>5/15/2019</a:t>
             </a:fld>
             <a:endParaRPr lang="en-US"/>
           </a:p>
@@ -1977,7 +1977,7 @@
           <a:p>
             <a:fld id="{B6DD1D87-65A1-464B-9CB6-79AFEB8594A9}" type="datetimeFigureOut">
               <a:rPr lang="en-US" smtClean="0"/>
-              <a:t>5/8/2019</a:t>
+              <a:t>5/15/2019</a:t>
             </a:fld>
             <a:endParaRPr lang="en-US"/>
           </a:p>
@@ -2254,7 +2254,7 @@
           <a:p>
             <a:fld id="{B6DD1D87-65A1-464B-9CB6-79AFEB8594A9}" type="datetimeFigureOut">
               <a:rPr lang="en-US" smtClean="0"/>
-              <a:t>5/8/2019</a:t>
+              <a:t>5/15/2019</a:t>
             </a:fld>
             <a:endParaRPr lang="en-US"/>
           </a:p>
@@ -2507,7 +2507,7 @@
           <a:p>
             <a:fld id="{B6DD1D87-65A1-464B-9CB6-79AFEB8594A9}" type="datetimeFigureOut">
               <a:rPr lang="en-US" smtClean="0"/>
-              <a:t>5/8/2019</a:t>
+              <a:t>5/15/2019</a:t>
             </a:fld>
             <a:endParaRPr lang="en-US"/>
           </a:p>
@@ -2720,7 +2720,7 @@
           <a:p>
             <a:fld id="{B6DD1D87-65A1-464B-9CB6-79AFEB8594A9}" type="datetimeFigureOut">
               <a:rPr lang="en-US" smtClean="0"/>
-              <a:t>5/8/2019</a:t>
+              <a:t>5/15/2019</a:t>
             </a:fld>
             <a:endParaRPr lang="en-US"/>
           </a:p>
@@ -4107,8 +4107,13 @@
                       <a:schemeClr val="tx1"/>
                     </a:solidFill>
                   </a:rPr>
-                  <a:t>WORKSPACE</a:t>
+                  <a:t>R WORKSPACE</a:t>
                 </a:r>
+                <a:endParaRPr lang="en-US" sz="3200" b="1" dirty="0" smtClean="0">
+                  <a:solidFill>
+                    <a:schemeClr val="tx1"/>
+                  </a:solidFill>
+                </a:endParaRPr>
               </a:p>
               <a:p>
                 <a:pPr algn="ctr"/>
@@ -4216,11 +4221,7 @@
                 </a:r>
                 <a:r>
                   <a:rPr lang="en-US" sz="1400" i="1" dirty="0" smtClean="0"/>
-                  <a:t> (</a:t>
-                </a:r>
-                <a:r>
-                  <a:rPr lang="en-US" sz="1400" i="1" dirty="0" smtClean="0"/>
-                  <a:t>shown in </a:t>
+                  <a:t> (shown in </a:t>
                 </a:r>
                 <a:r>
                   <a:rPr lang="en-US" sz="1400" b="1" i="1" dirty="0" smtClean="0">
@@ -4232,11 +4233,7 @@
                 </a:r>
                 <a:r>
                   <a:rPr lang="en-US" sz="1400" i="1" dirty="0" smtClean="0"/>
-                  <a:t>) </a:t>
-                </a:r>
-                <a:r>
-                  <a:rPr lang="en-US" sz="1400" i="1" dirty="0" smtClean="0"/>
-                  <a:t>are defined in user environments which may be </a:t>
+                  <a:t>) are defined in user environments which may be </a:t>
                 </a:r>
                 <a:r>
                   <a:rPr lang="en-US" sz="1400" b="1" i="1" dirty="0" smtClean="0"/>

</xml_diff>